<commit_message>
added latest versions of the files
</commit_message>
<xml_diff>
--- a/Design Patterns.pptx
+++ b/Design Patterns.pptx
@@ -775,8 +775,8 @@
         </p:nvSpPr>
         <p:spPr>
           <a:xfrm>
-            <a:off x="381188" y="685800"/>
-            <a:ext cx="6096300" cy="3429000"/>
+            <a:off x="381000" y="685800"/>
+            <a:ext cx="6096000" cy="3429000"/>
           </a:xfrm>
           <a:custGeom>
             <a:avLst/>
@@ -840,10 +840,58 @@
               <a:buAutoNum type="arabicPeriod"/>
             </a:pPr>
             <a:r>
-              <a:rPr lang="en"/>
+              <a:rPr lang="en" dirty="0"/>
               <a:t>All resources will be made available.</a:t>
             </a:r>
-            <a:endParaRPr/>
+          </a:p>
+          <a:p>
+            <a:pPr marL="457200" lvl="0" indent="-317500" algn="l" rtl="0">
+              <a:spcBef>
+                <a:spcPts val="0"/>
+              </a:spcBef>
+              <a:spcAft>
+                <a:spcPts val="0"/>
+              </a:spcAft>
+              <a:buSzPts val="1400"/>
+              <a:buAutoNum type="arabicPeriod"/>
+            </a:pPr>
+            <a:r>
+              <a:rPr lang="en" dirty="0"/>
+              <a:t>Book</a:t>
+            </a:r>
+            <a:endParaRPr lang="bg-BG" dirty="0"/>
+          </a:p>
+          <a:p>
+            <a:pPr marL="457200" lvl="0" indent="-317500" algn="l" rtl="0">
+              <a:spcBef>
+                <a:spcPts val="0"/>
+              </a:spcBef>
+              <a:spcAft>
+                <a:spcPts val="0"/>
+              </a:spcAft>
+              <a:buSzPts val="1400"/>
+              <a:buAutoNum type="arabicPeriod"/>
+            </a:pPr>
+            <a:r>
+              <a:rPr lang="en-US" dirty="0"/>
+              <a:t>More of an memory refresh and introduction than a deep dive</a:t>
+            </a:r>
+          </a:p>
+          <a:p>
+            <a:pPr marL="457200" lvl="0" indent="-317500" algn="l" rtl="0">
+              <a:spcBef>
+                <a:spcPts val="0"/>
+              </a:spcBef>
+              <a:spcAft>
+                <a:spcPts val="0"/>
+              </a:spcAft>
+              <a:buSzPts val="1400"/>
+              <a:buAutoNum type="arabicPeriod"/>
+            </a:pPr>
+            <a:r>
+              <a:rPr lang="en-US" dirty="0"/>
+              <a:t>Participation is encouraged</a:t>
+            </a:r>
           </a:p>
         </p:txBody>
       </p:sp>
@@ -1980,8 +2028,8 @@
         </p:nvSpPr>
         <p:spPr>
           <a:xfrm>
-            <a:off x="381188" y="685800"/>
-            <a:ext cx="6096300" cy="3429000"/>
+            <a:off x="381000" y="685800"/>
+            <a:ext cx="6096000" cy="3429000"/>
           </a:xfrm>
           <a:custGeom>
             <a:avLst/>
@@ -2043,7 +2091,26 @@
               </a:spcAft>
               <a:buNone/>
             </a:pPr>
-            <a:endParaRPr/>
+            <a:r>
+              <a:rPr lang="en-US" dirty="0"/>
+              <a:t>Encapsulates a piece of logic that can then be viewed as an Entity.</a:t>
+            </a:r>
+          </a:p>
+          <a:p>
+            <a:pPr marL="0" lvl="0" indent="0" algn="l" rtl="0">
+              <a:spcBef>
+                <a:spcPts val="0"/>
+              </a:spcBef>
+              <a:spcAft>
+                <a:spcPts val="0"/>
+              </a:spcAft>
+              <a:buNone/>
+            </a:pPr>
+            <a:r>
+              <a:rPr lang="en-US" dirty="0"/>
+              <a:t>Allows us to change the behavior of a class without changing it. </a:t>
+            </a:r>
+            <a:endParaRPr dirty="0"/>
           </a:p>
         </p:txBody>
       </p:sp>
@@ -2296,7 +2363,7 @@
         </p:nvSpPr>
         <p:spPr>
           <a:xfrm>
-            <a:off x="381300" y="685800"/>
+            <a:off x="381000" y="685800"/>
             <a:ext cx="6096000" cy="3429000"/>
           </a:xfrm>
           <a:custGeom>
@@ -13524,13 +13591,13 @@
   <p:clrMapOvr>
     <a:masterClrMapping/>
   </p:clrMapOvr>
-  <mc:AlternateContent xmlns:mc="http://schemas.openxmlformats.org/markup-compatibility/2006">
-    <mc:Choice xmlns:p14="http://schemas.microsoft.com/office/powerpoint/2010/main" Requires="p14">
+  <mc:AlternateContent xmlns:mc="http://schemas.openxmlformats.org/markup-compatibility/2006" xmlns:p14="http://schemas.microsoft.com/office/powerpoint/2010/main">
+    <mc:Choice Requires="p14">
       <p:transition spd="med" p14:dur="700">
         <p:fade/>
       </p:transition>
     </mc:Choice>
-    <mc:Fallback>
+    <mc:Fallback xmlns="">
       <p:transition spd="med">
         <p:fade/>
       </p:transition>
@@ -13645,13 +13712,13 @@
   <p:clrMapOvr>
     <a:masterClrMapping/>
   </p:clrMapOvr>
-  <mc:AlternateContent xmlns:mc="http://schemas.openxmlformats.org/markup-compatibility/2006">
-    <mc:Choice xmlns:p14="http://schemas.microsoft.com/office/powerpoint/2010/main" Requires="p14">
+  <mc:AlternateContent xmlns:mc="http://schemas.openxmlformats.org/markup-compatibility/2006" xmlns:p14="http://schemas.microsoft.com/office/powerpoint/2010/main">
+    <mc:Choice Requires="p14">
       <p:transition spd="med" p14:dur="700">
         <p:fade/>
       </p:transition>
     </mc:Choice>
-    <mc:Fallback>
+    <mc:Fallback xmlns="">
       <p:transition spd="med">
         <p:fade/>
       </p:transition>
@@ -14108,13 +14175,13 @@
   <p:clrMapOvr>
     <a:masterClrMapping/>
   </p:clrMapOvr>
-  <mc:AlternateContent xmlns:mc="http://schemas.openxmlformats.org/markup-compatibility/2006">
-    <mc:Choice xmlns:p14="http://schemas.microsoft.com/office/powerpoint/2010/main" Requires="p14">
+  <mc:AlternateContent xmlns:mc="http://schemas.openxmlformats.org/markup-compatibility/2006" xmlns:p14="http://schemas.microsoft.com/office/powerpoint/2010/main">
+    <mc:Choice Requires="p14">
       <p:transition spd="med" p14:dur="700">
         <p:fade/>
       </p:transition>
     </mc:Choice>
-    <mc:Fallback>
+    <mc:Fallback xmlns="">
       <p:transition spd="med">
         <p:fade/>
       </p:transition>
@@ -15333,13 +15400,13 @@
   <p:clrMapOvr>
     <a:masterClrMapping/>
   </p:clrMapOvr>
-  <mc:AlternateContent xmlns:mc="http://schemas.openxmlformats.org/markup-compatibility/2006">
-    <mc:Choice xmlns:p14="http://schemas.microsoft.com/office/powerpoint/2010/main" Requires="p14">
+  <mc:AlternateContent xmlns:mc="http://schemas.openxmlformats.org/markup-compatibility/2006" xmlns:p14="http://schemas.microsoft.com/office/powerpoint/2010/main">
+    <mc:Choice Requires="p14">
       <p:transition spd="med" p14:dur="700">
         <p:fade/>
       </p:transition>
     </mc:Choice>
-    <mc:Fallback>
+    <mc:Fallback xmlns="">
       <p:transition spd="med">
         <p:fade/>
       </p:transition>
@@ -16332,13 +16399,13 @@
   <p:clrMapOvr>
     <a:masterClrMapping/>
   </p:clrMapOvr>
-  <mc:AlternateContent xmlns:mc="http://schemas.openxmlformats.org/markup-compatibility/2006">
-    <mc:Choice xmlns:p14="http://schemas.microsoft.com/office/powerpoint/2010/main" Requires="p14">
+  <mc:AlternateContent xmlns:mc="http://schemas.openxmlformats.org/markup-compatibility/2006" xmlns:p14="http://schemas.microsoft.com/office/powerpoint/2010/main">
+    <mc:Choice Requires="p14">
       <p:transition spd="med" p14:dur="700">
         <p:fade/>
       </p:transition>
     </mc:Choice>
-    <mc:Fallback>
+    <mc:Fallback xmlns="">
       <p:transition spd="med">
         <p:fade/>
       </p:transition>
@@ -16411,13 +16478,13 @@
   <p:clrMapOvr>
     <a:masterClrMapping/>
   </p:clrMapOvr>
-  <mc:AlternateContent xmlns:mc="http://schemas.openxmlformats.org/markup-compatibility/2006">
-    <mc:Choice xmlns:p14="http://schemas.microsoft.com/office/powerpoint/2010/main" Requires="p14">
+  <mc:AlternateContent xmlns:mc="http://schemas.openxmlformats.org/markup-compatibility/2006" xmlns:p14="http://schemas.microsoft.com/office/powerpoint/2010/main">
+    <mc:Choice Requires="p14">
       <p:transition spd="med" p14:dur="700">
         <p:fade/>
       </p:transition>
     </mc:Choice>
-    <mc:Fallback>
+    <mc:Fallback xmlns="">
       <p:transition spd="med">
         <p:fade/>
       </p:transition>
@@ -16532,13 +16599,13 @@
   <p:clrMapOvr>
     <a:masterClrMapping/>
   </p:clrMapOvr>
-  <mc:AlternateContent xmlns:mc="http://schemas.openxmlformats.org/markup-compatibility/2006">
-    <mc:Choice xmlns:p14="http://schemas.microsoft.com/office/powerpoint/2010/main" Requires="p14">
+  <mc:AlternateContent xmlns:mc="http://schemas.openxmlformats.org/markup-compatibility/2006" xmlns:p14="http://schemas.microsoft.com/office/powerpoint/2010/main">
+    <mc:Choice Requires="p14">
       <p:transition spd="med" p14:dur="700">
         <p:fade/>
       </p:transition>
     </mc:Choice>
-    <mc:Fallback>
+    <mc:Fallback xmlns="">
       <p:transition spd="med">
         <p:fade/>
       </p:transition>
@@ -16843,13 +16910,13 @@
   <p:clrMapOvr>
     <a:masterClrMapping/>
   </p:clrMapOvr>
-  <mc:AlternateContent xmlns:mc="http://schemas.openxmlformats.org/markup-compatibility/2006">
-    <mc:Choice xmlns:p14="http://schemas.microsoft.com/office/powerpoint/2010/main" Requires="p14">
+  <mc:AlternateContent xmlns:mc="http://schemas.openxmlformats.org/markup-compatibility/2006" xmlns:p14="http://schemas.microsoft.com/office/powerpoint/2010/main">
+    <mc:Choice Requires="p14">
       <p:transition spd="med" p14:dur="700">
         <p:fade/>
       </p:transition>
     </mc:Choice>
-    <mc:Fallback>
+    <mc:Fallback xmlns="">
       <p:transition spd="med">
         <p:fade/>
       </p:transition>
@@ -16972,13 +17039,13 @@
   <p:clrMapOvr>
     <a:masterClrMapping/>
   </p:clrMapOvr>
-  <mc:AlternateContent xmlns:mc="http://schemas.openxmlformats.org/markup-compatibility/2006">
-    <mc:Choice xmlns:p14="http://schemas.microsoft.com/office/powerpoint/2010/main" Requires="p14">
+  <mc:AlternateContent xmlns:mc="http://schemas.openxmlformats.org/markup-compatibility/2006" xmlns:p14="http://schemas.microsoft.com/office/powerpoint/2010/main">
+    <mc:Choice Requires="p14">
       <p:transition spd="med" p14:dur="700">
         <p:fade/>
       </p:transition>
     </mc:Choice>
-    <mc:Fallback>
+    <mc:Fallback xmlns="">
       <p:transition spd="med">
         <p:fade/>
       </p:transition>
@@ -18264,13 +18331,13 @@
   <p:clrMapOvr>
     <a:masterClrMapping/>
   </p:clrMapOvr>
-  <mc:AlternateContent xmlns:mc="http://schemas.openxmlformats.org/markup-compatibility/2006">
-    <mc:Choice xmlns:p14="http://schemas.microsoft.com/office/powerpoint/2010/main" Requires="p14">
+  <mc:AlternateContent xmlns:mc="http://schemas.openxmlformats.org/markup-compatibility/2006" xmlns:p14="http://schemas.microsoft.com/office/powerpoint/2010/main">
+    <mc:Choice Requires="p14">
       <p:transition spd="med" p14:dur="700">
         <p:fade/>
       </p:transition>
     </mc:Choice>
-    <mc:Fallback>
+    <mc:Fallback xmlns="">
       <p:transition spd="med">
         <p:fade/>
       </p:transition>
@@ -18976,13 +19043,13 @@
   <p:clrMapOvr>
     <a:masterClrMapping/>
   </p:clrMapOvr>
-  <mc:AlternateContent xmlns:mc="http://schemas.openxmlformats.org/markup-compatibility/2006">
-    <mc:Choice xmlns:p14="http://schemas.microsoft.com/office/powerpoint/2010/main" Requires="p14">
+  <mc:AlternateContent xmlns:mc="http://schemas.openxmlformats.org/markup-compatibility/2006" xmlns:p14="http://schemas.microsoft.com/office/powerpoint/2010/main">
+    <mc:Choice Requires="p14">
       <p:transition spd="med" p14:dur="700">
         <p:fade/>
       </p:transition>
     </mc:Choice>
-    <mc:Fallback>
+    <mc:Fallback xmlns="">
       <p:transition spd="med">
         <p:fade/>
       </p:transition>
@@ -19097,13 +19164,13 @@
   <p:clrMapOvr>
     <a:masterClrMapping/>
   </p:clrMapOvr>
-  <mc:AlternateContent xmlns:mc="http://schemas.openxmlformats.org/markup-compatibility/2006">
-    <mc:Choice xmlns:p14="http://schemas.microsoft.com/office/powerpoint/2010/main" Requires="p14">
+  <mc:AlternateContent xmlns:mc="http://schemas.openxmlformats.org/markup-compatibility/2006" xmlns:p14="http://schemas.microsoft.com/office/powerpoint/2010/main">
+    <mc:Choice Requires="p14">
       <p:transition spd="med" p14:dur="700">
         <p:fade/>
       </p:transition>
     </mc:Choice>
-    <mc:Fallback>
+    <mc:Fallback xmlns="">
       <p:transition spd="med">
         <p:fade/>
       </p:transition>
@@ -19270,13 +19337,13 @@
   <p:clrMapOvr>
     <a:masterClrMapping/>
   </p:clrMapOvr>
-  <mc:AlternateContent xmlns:mc="http://schemas.openxmlformats.org/markup-compatibility/2006">
-    <mc:Choice xmlns:p14="http://schemas.microsoft.com/office/powerpoint/2010/main" Requires="p14">
+  <mc:AlternateContent xmlns:mc="http://schemas.openxmlformats.org/markup-compatibility/2006" xmlns:p14="http://schemas.microsoft.com/office/powerpoint/2010/main">
+    <mc:Choice Requires="p14">
       <p:transition spd="med" p14:dur="700">
         <p:fade/>
       </p:transition>
     </mc:Choice>
-    <mc:Fallback>
+    <mc:Fallback xmlns="">
       <p:transition spd="med">
         <p:fade/>
       </p:transition>
@@ -19391,13 +19458,13 @@
   <p:clrMapOvr>
     <a:masterClrMapping/>
   </p:clrMapOvr>
-  <mc:AlternateContent xmlns:mc="http://schemas.openxmlformats.org/markup-compatibility/2006">
-    <mc:Choice xmlns:p14="http://schemas.microsoft.com/office/powerpoint/2010/main" Requires="p14">
+  <mc:AlternateContent xmlns:mc="http://schemas.openxmlformats.org/markup-compatibility/2006" xmlns:p14="http://schemas.microsoft.com/office/powerpoint/2010/main">
+    <mc:Choice Requires="p14">
       <p:transition spd="med" p14:dur="700">
         <p:fade/>
       </p:transition>
     </mc:Choice>
-    <mc:Fallback>
+    <mc:Fallback xmlns="">
       <p:transition spd="med">
         <p:fade/>
       </p:transition>
@@ -19998,26 +20065,26 @@
               <a:buNone/>
             </a:pPr>
             <a:r>
-              <a:rPr lang="en"/>
-              <a:t>xmld </a:t>
-            </a:r>
-            <a:r>
-              <a:rPr lang="en" b="1"/>
+              <a:rPr lang="en" dirty="0"/>
+              <a:t>xml </a:t>
+            </a:r>
+            <a:r>
+              <a:rPr lang="en" b="1" dirty="0" err="1"/>
               <a:t>specificRequest</a:t>
             </a:r>
             <a:r>
-              <a:rPr lang="en"/>
+              <a:rPr lang="en" dirty="0"/>
               <a:t>(Xml </a:t>
             </a:r>
             <a:r>
-              <a:rPr lang="en" b="1"/>
+              <a:rPr lang="en" b="1" dirty="0"/>
               <a:t>x</a:t>
             </a:r>
             <a:r>
-              <a:rPr lang="en"/>
+              <a:rPr lang="en" dirty="0"/>
               <a:t>);</a:t>
             </a:r>
-            <a:endParaRPr/>
+            <a:endParaRPr dirty="0"/>
           </a:p>
         </p:txBody>
       </p:sp>
@@ -20631,13 +20698,13 @@
   <p:clrMapOvr>
     <a:masterClrMapping/>
   </p:clrMapOvr>
-  <mc:AlternateContent xmlns:mc="http://schemas.openxmlformats.org/markup-compatibility/2006">
-    <mc:Choice xmlns:p14="http://schemas.microsoft.com/office/powerpoint/2010/main" Requires="p14">
+  <mc:AlternateContent xmlns:mc="http://schemas.openxmlformats.org/markup-compatibility/2006" xmlns:p14="http://schemas.microsoft.com/office/powerpoint/2010/main">
+    <mc:Choice Requires="p14">
       <p:transition spd="med" p14:dur="700">
         <p:fade/>
       </p:transition>
     </mc:Choice>
-    <mc:Fallback>
+    <mc:Fallback xmlns="">
       <p:transition spd="med">
         <p:fade/>
       </p:transition>
@@ -21476,13 +21543,13 @@
   <p:clrMapOvr>
     <a:masterClrMapping/>
   </p:clrMapOvr>
-  <mc:AlternateContent xmlns:mc="http://schemas.openxmlformats.org/markup-compatibility/2006">
-    <mc:Choice xmlns:p14="http://schemas.microsoft.com/office/powerpoint/2010/main" Requires="p14">
+  <mc:AlternateContent xmlns:mc="http://schemas.openxmlformats.org/markup-compatibility/2006" xmlns:p14="http://schemas.microsoft.com/office/powerpoint/2010/main">
+    <mc:Choice Requires="p14">
       <p:transition spd="med" p14:dur="700">
         <p:fade/>
       </p:transition>
     </mc:Choice>
-    <mc:Fallback>
+    <mc:Fallback xmlns="">
       <p:transition spd="med">
         <p:fade/>
       </p:transition>
@@ -21555,13 +21622,13 @@
   <p:clrMapOvr>
     <a:masterClrMapping/>
   </p:clrMapOvr>
-  <mc:AlternateContent xmlns:mc="http://schemas.openxmlformats.org/markup-compatibility/2006">
-    <mc:Choice xmlns:p14="http://schemas.microsoft.com/office/powerpoint/2010/main" Requires="p14">
+  <mc:AlternateContent xmlns:mc="http://schemas.openxmlformats.org/markup-compatibility/2006" xmlns:p14="http://schemas.microsoft.com/office/powerpoint/2010/main">
+    <mc:Choice Requires="p14">
       <p:transition spd="med" p14:dur="700">
         <p:fade/>
       </p:transition>
     </mc:Choice>
-    <mc:Fallback>
+    <mc:Fallback xmlns="">
       <p:transition spd="med">
         <p:fade/>
       </p:transition>
@@ -21697,13 +21764,13 @@
   <p:clrMapOvr>
     <a:masterClrMapping/>
   </p:clrMapOvr>
-  <mc:AlternateContent xmlns:mc="http://schemas.openxmlformats.org/markup-compatibility/2006">
-    <mc:Choice xmlns:p14="http://schemas.microsoft.com/office/powerpoint/2010/main" Requires="p14">
+  <mc:AlternateContent xmlns:mc="http://schemas.openxmlformats.org/markup-compatibility/2006" xmlns:p14="http://schemas.microsoft.com/office/powerpoint/2010/main">
+    <mc:Choice Requires="p14">
       <p:transition spd="med" p14:dur="700">
         <p:fade/>
       </p:transition>
     </mc:Choice>
-    <mc:Fallback>
+    <mc:Fallback xmlns="">
       <p:transition spd="med">
         <p:fade/>
       </p:transition>
@@ -22064,7 +22131,7 @@
               <a:buNone/>
             </a:pPr>
             <a:r>
-              <a:rPr lang="en" sz="1300">
+              <a:rPr lang="en" sz="1300" dirty="0">
                 <a:solidFill>
                   <a:schemeClr val="dk1"/>
                 </a:solidFill>
@@ -22076,7 +22143,7 @@
               <a:t>string </a:t>
             </a:r>
             <a:r>
-              <a:rPr lang="en" sz="1300" b="1">
+              <a:rPr lang="en" sz="1300" b="1" dirty="0">
                 <a:solidFill>
                   <a:schemeClr val="dk1"/>
                 </a:solidFill>
@@ -22088,7 +22155,7 @@
               <a:t>description</a:t>
             </a:r>
             <a:r>
-              <a:rPr lang="en" sz="1300">
+              <a:rPr lang="en" sz="1300" dirty="0">
                 <a:solidFill>
                   <a:schemeClr val="dk1"/>
                 </a:solidFill>
@@ -22099,7 +22166,7 @@
               </a:rPr>
               <a:t>();</a:t>
             </a:r>
-            <a:endParaRPr sz="1300">
+            <a:endParaRPr sz="1300" dirty="0">
               <a:solidFill>
                 <a:schemeClr val="dk1"/>
               </a:solidFill>
@@ -22120,7 +22187,7 @@
               <a:buNone/>
             </a:pPr>
             <a:r>
-              <a:rPr lang="en" sz="1300">
+              <a:rPr lang="en" sz="1300" dirty="0">
                 <a:solidFill>
                   <a:schemeClr val="dk1"/>
                 </a:solidFill>
@@ -22132,7 +22199,7 @@
               <a:t>double </a:t>
             </a:r>
             <a:r>
-              <a:rPr lang="en" sz="1300" b="1">
+              <a:rPr lang="en" sz="1300" b="1" dirty="0">
                 <a:solidFill>
                   <a:schemeClr val="dk1"/>
                 </a:solidFill>
@@ -22144,7 +22211,7 @@
               <a:t>price</a:t>
             </a:r>
             <a:r>
-              <a:rPr lang="en" sz="1300">
+              <a:rPr lang="en" sz="1300" dirty="0">
                 <a:solidFill>
                   <a:schemeClr val="dk1"/>
                 </a:solidFill>
@@ -22155,7 +22222,7 @@
               </a:rPr>
               <a:t>();</a:t>
             </a:r>
-            <a:endParaRPr/>
+            <a:endParaRPr dirty="0"/>
           </a:p>
         </p:txBody>
       </p:sp>
@@ -22256,17 +22323,9 @@
           </a:bodyPr>
           <a:lstStyle/>
           <a:p>
-            <a:pPr marL="0" lvl="0" indent="0" algn="l" rtl="0">
-              <a:spcBef>
-                <a:spcPts val="0"/>
-              </a:spcBef>
-              <a:spcAft>
-                <a:spcPts val="0"/>
-              </a:spcAft>
-              <a:buNone/>
-            </a:pPr>
-            <a:r>
-              <a:rPr lang="en" sz="1300">
+            <a:pPr lvl="0"/>
+            <a:r>
+              <a:rPr lang="en-GB" sz="1300" dirty="0">
                 <a:solidFill>
                   <a:schemeClr val="dk1"/>
                 </a:solidFill>
@@ -22275,10 +22334,10 @@
                 <a:cs typeface="Proxima Nova"/>
                 <a:sym typeface="Proxima Nova"/>
               </a:rPr>
-              <a:t>byte </a:t>
-            </a:r>
-            <a:r>
-              <a:rPr lang="en" sz="1300" b="1">
+              <a:t>string </a:t>
+            </a:r>
+            <a:r>
+              <a:rPr lang="en-GB" sz="1300" b="1" dirty="0">
                 <a:solidFill>
                   <a:schemeClr val="dk1"/>
                 </a:solidFill>
@@ -22287,10 +22346,10 @@
                 <a:cs typeface="Proxima Nova"/>
                 <a:sym typeface="Proxima Nova"/>
               </a:rPr>
-              <a:t>read</a:t>
-            </a:r>
-            <a:r>
-              <a:rPr lang="en" sz="1300">
+              <a:t>description</a:t>
+            </a:r>
+            <a:r>
+              <a:rPr lang="en-GB" sz="1300" dirty="0">
                 <a:solidFill>
                   <a:schemeClr val="dk1"/>
                 </a:solidFill>
@@ -22301,28 +22360,11 @@
               </a:rPr>
               <a:t>();</a:t>
             </a:r>
-            <a:endParaRPr sz="1300">
-              <a:solidFill>
-                <a:schemeClr val="dk1"/>
-              </a:solidFill>
-              <a:latin typeface="Proxima Nova"/>
-              <a:ea typeface="Proxima Nova"/>
-              <a:cs typeface="Proxima Nova"/>
-              <a:sym typeface="Proxima Nova"/>
-            </a:endParaRPr>
-          </a:p>
-          <a:p>
-            <a:pPr marL="0" lvl="0" indent="0" algn="l" rtl="0">
-              <a:spcBef>
-                <a:spcPts val="0"/>
-              </a:spcBef>
-              <a:spcAft>
-                <a:spcPts val="0"/>
-              </a:spcAft>
-              <a:buNone/>
-            </a:pPr>
-            <a:r>
-              <a:rPr lang="en" sz="1300">
+          </a:p>
+          <a:p>
+            <a:pPr lvl="0"/>
+            <a:r>
+              <a:rPr lang="en-GB" sz="1300" dirty="0">
                 <a:solidFill>
                   <a:schemeClr val="dk1"/>
                 </a:solidFill>
@@ -22331,10 +22373,10 @@
                 <a:cs typeface="Proxima Nova"/>
                 <a:sym typeface="Proxima Nova"/>
               </a:rPr>
-              <a:t>void </a:t>
-            </a:r>
-            <a:r>
-              <a:rPr lang="en" sz="1300" b="1">
+              <a:t>double </a:t>
+            </a:r>
+            <a:r>
+              <a:rPr lang="en-GB" sz="1300" b="1" dirty="0">
                 <a:solidFill>
                   <a:schemeClr val="dk1"/>
                 </a:solidFill>
@@ -22343,10 +22385,10 @@
                 <a:cs typeface="Proxima Nova"/>
                 <a:sym typeface="Proxima Nova"/>
               </a:rPr>
-              <a:t>write</a:t>
-            </a:r>
-            <a:r>
-              <a:rPr lang="en" sz="1300">
+              <a:t>price</a:t>
+            </a:r>
+            <a:r>
+              <a:rPr lang="en-GB" sz="1300" dirty="0">
                 <a:solidFill>
                   <a:schemeClr val="dk1"/>
                 </a:solidFill>
@@ -22355,33 +22397,9 @@
                 <a:cs typeface="Proxima Nova"/>
                 <a:sym typeface="Proxima Nova"/>
               </a:rPr>
-              <a:t>(byte </a:t>
-            </a:r>
-            <a:r>
-              <a:rPr lang="en" sz="1300" b="1">
-                <a:solidFill>
-                  <a:schemeClr val="dk1"/>
-                </a:solidFill>
-                <a:latin typeface="Proxima Nova"/>
-                <a:ea typeface="Proxima Nova"/>
-                <a:cs typeface="Proxima Nova"/>
-                <a:sym typeface="Proxima Nova"/>
-              </a:rPr>
-              <a:t>b</a:t>
-            </a:r>
-            <a:r>
-              <a:rPr lang="en" sz="1300">
-                <a:solidFill>
-                  <a:schemeClr val="dk1"/>
-                </a:solidFill>
-                <a:latin typeface="Proxima Nova"/>
-                <a:ea typeface="Proxima Nova"/>
-                <a:cs typeface="Proxima Nova"/>
-                <a:sym typeface="Proxima Nova"/>
-              </a:rPr>
-              <a:t>);</a:t>
-            </a:r>
-            <a:endParaRPr/>
+              <a:t>();</a:t>
+            </a:r>
+            <a:endParaRPr lang="en-GB" sz="1200" dirty="0"/>
           </a:p>
         </p:txBody>
       </p:sp>
@@ -22509,37 +22527,9 @@
           </a:bodyPr>
           <a:lstStyle/>
           <a:p>
-            <a:pPr marL="0" lvl="0" indent="0" algn="l" rtl="0">
-              <a:spcBef>
-                <a:spcPts val="0"/>
-              </a:spcBef>
-              <a:spcAft>
-                <a:spcPts val="0"/>
-              </a:spcAft>
-              <a:buNone/>
-            </a:pPr>
-            <a:endParaRPr sz="1300">
-              <a:solidFill>
-                <a:schemeClr val="dk1"/>
-              </a:solidFill>
-              <a:latin typeface="Proxima Nova"/>
-              <a:ea typeface="Proxima Nova"/>
-              <a:cs typeface="Proxima Nova"/>
-              <a:sym typeface="Proxima Nova"/>
-            </a:endParaRPr>
-          </a:p>
-          <a:p>
-            <a:pPr marL="0" lvl="0" indent="0" algn="l" rtl="0">
-              <a:spcBef>
-                <a:spcPts val="0"/>
-              </a:spcBef>
-              <a:spcAft>
-                <a:spcPts val="0"/>
-              </a:spcAft>
-              <a:buNone/>
-            </a:pPr>
-            <a:r>
-              <a:rPr lang="en" sz="1300">
+            <a:pPr lvl="0"/>
+            <a:r>
+              <a:rPr lang="en-GB" sz="1300" dirty="0">
                 <a:solidFill>
                   <a:schemeClr val="dk1"/>
                 </a:solidFill>
@@ -22548,10 +22538,10 @@
                 <a:cs typeface="Proxima Nova"/>
                 <a:sym typeface="Proxima Nova"/>
               </a:rPr>
-              <a:t>byte </a:t>
-            </a:r>
-            <a:r>
-              <a:rPr lang="en" sz="1300" b="1">
+              <a:t>string </a:t>
+            </a:r>
+            <a:r>
+              <a:rPr lang="en-GB" sz="1300" b="1" dirty="0">
                 <a:solidFill>
                   <a:schemeClr val="dk1"/>
                 </a:solidFill>
@@ -22560,10 +22550,10 @@
                 <a:cs typeface="Proxima Nova"/>
                 <a:sym typeface="Proxima Nova"/>
               </a:rPr>
-              <a:t>read</a:t>
-            </a:r>
-            <a:r>
-              <a:rPr lang="en" sz="1300">
+              <a:t>description</a:t>
+            </a:r>
+            <a:r>
+              <a:rPr lang="en-GB" sz="1300" dirty="0">
                 <a:solidFill>
                   <a:schemeClr val="dk1"/>
                 </a:solidFill>
@@ -22574,28 +22564,11 @@
               </a:rPr>
               <a:t>();</a:t>
             </a:r>
-            <a:endParaRPr sz="1300">
-              <a:solidFill>
-                <a:schemeClr val="dk1"/>
-              </a:solidFill>
-              <a:latin typeface="Proxima Nova"/>
-              <a:ea typeface="Proxima Nova"/>
-              <a:cs typeface="Proxima Nova"/>
-              <a:sym typeface="Proxima Nova"/>
-            </a:endParaRPr>
-          </a:p>
-          <a:p>
-            <a:pPr marL="0" lvl="0" indent="0" algn="l" rtl="0">
-              <a:spcBef>
-                <a:spcPts val="0"/>
-              </a:spcBef>
-              <a:spcAft>
-                <a:spcPts val="0"/>
-              </a:spcAft>
-              <a:buNone/>
-            </a:pPr>
-            <a:r>
-              <a:rPr lang="en" sz="1300">
+          </a:p>
+          <a:p>
+            <a:pPr lvl="0"/>
+            <a:r>
+              <a:rPr lang="en-GB" sz="1300" dirty="0">
                 <a:solidFill>
                   <a:schemeClr val="dk1"/>
                 </a:solidFill>
@@ -22604,10 +22577,10 @@
                 <a:cs typeface="Proxima Nova"/>
                 <a:sym typeface="Proxima Nova"/>
               </a:rPr>
-              <a:t>void </a:t>
-            </a:r>
-            <a:r>
-              <a:rPr lang="en" sz="1300" b="1">
+              <a:t>double </a:t>
+            </a:r>
+            <a:r>
+              <a:rPr lang="en-GB" sz="1300" b="1" dirty="0">
                 <a:solidFill>
                   <a:schemeClr val="dk1"/>
                 </a:solidFill>
@@ -22616,10 +22589,10 @@
                 <a:cs typeface="Proxima Nova"/>
                 <a:sym typeface="Proxima Nova"/>
               </a:rPr>
-              <a:t>write</a:t>
-            </a:r>
-            <a:r>
-              <a:rPr lang="en" sz="1300">
+              <a:t>price</a:t>
+            </a:r>
+            <a:r>
+              <a:rPr lang="en-GB" sz="1300" dirty="0">
                 <a:solidFill>
                   <a:schemeClr val="dk1"/>
                 </a:solidFill>
@@ -22628,33 +22601,9 @@
                 <a:cs typeface="Proxima Nova"/>
                 <a:sym typeface="Proxima Nova"/>
               </a:rPr>
-              <a:t>(byte </a:t>
-            </a:r>
-            <a:r>
-              <a:rPr lang="en" sz="1300" b="1">
-                <a:solidFill>
-                  <a:schemeClr val="dk1"/>
-                </a:solidFill>
-                <a:latin typeface="Proxima Nova"/>
-                <a:ea typeface="Proxima Nova"/>
-                <a:cs typeface="Proxima Nova"/>
-                <a:sym typeface="Proxima Nova"/>
-              </a:rPr>
-              <a:t>b</a:t>
-            </a:r>
-            <a:r>
-              <a:rPr lang="en" sz="1300">
-                <a:solidFill>
-                  <a:schemeClr val="dk1"/>
-                </a:solidFill>
-                <a:latin typeface="Proxima Nova"/>
-                <a:ea typeface="Proxima Nova"/>
-                <a:cs typeface="Proxima Nova"/>
-                <a:sym typeface="Proxima Nova"/>
-              </a:rPr>
-              <a:t>);</a:t>
-            </a:r>
-            <a:endParaRPr/>
+              <a:t>();</a:t>
+            </a:r>
+            <a:endParaRPr lang="en-GB" sz="1200" dirty="0"/>
           </a:p>
         </p:txBody>
       </p:sp>
@@ -24592,13 +24541,13 @@
   <p:clrMapOvr>
     <a:masterClrMapping/>
   </p:clrMapOvr>
-  <mc:AlternateContent xmlns:mc="http://schemas.openxmlformats.org/markup-compatibility/2006">
-    <mc:Choice xmlns:p14="http://schemas.microsoft.com/office/powerpoint/2010/main" Requires="p14">
+  <mc:AlternateContent xmlns:mc="http://schemas.openxmlformats.org/markup-compatibility/2006" xmlns:p14="http://schemas.microsoft.com/office/powerpoint/2010/main">
+    <mc:Choice Requires="p14">
       <p:transition spd="med" p14:dur="700">
         <p:fade/>
       </p:transition>
     </mc:Choice>
-    <mc:Fallback>
+    <mc:Fallback xmlns="">
       <p:transition spd="med">
         <p:fade/>
       </p:transition>
@@ -25597,7 +25546,7 @@
               <a:buNone/>
             </a:pPr>
             <a:r>
-              <a:rPr lang="en" sz="1300">
+              <a:rPr lang="en" sz="1300" dirty="0">
                 <a:solidFill>
                   <a:schemeClr val="dk1"/>
                 </a:solidFill>
@@ -25609,7 +25558,7 @@
               <a:t>string </a:t>
             </a:r>
             <a:r>
-              <a:rPr lang="en" sz="1300" b="1">
+              <a:rPr lang="en" sz="1300" b="1" dirty="0">
                 <a:solidFill>
                   <a:schemeClr val="dk1"/>
                 </a:solidFill>
@@ -25621,7 +25570,7 @@
               <a:t>description</a:t>
             </a:r>
             <a:r>
-              <a:rPr lang="en" sz="1300">
+              <a:rPr lang="en" sz="1300" dirty="0">
                 <a:solidFill>
                   <a:schemeClr val="dk1"/>
                 </a:solidFill>
@@ -25632,7 +25581,7 @@
               </a:rPr>
               <a:t>();</a:t>
             </a:r>
-            <a:endParaRPr sz="1300">
+            <a:endParaRPr sz="1300" dirty="0">
               <a:solidFill>
                 <a:schemeClr val="dk1"/>
               </a:solidFill>
@@ -25653,7 +25602,7 @@
               <a:buNone/>
             </a:pPr>
             <a:r>
-              <a:rPr lang="en" sz="1300">
+              <a:rPr lang="en" sz="1300" dirty="0">
                 <a:solidFill>
                   <a:schemeClr val="dk1"/>
                 </a:solidFill>
@@ -25665,7 +25614,7 @@
               <a:t>double </a:t>
             </a:r>
             <a:r>
-              <a:rPr lang="en" sz="1300" b="1">
+              <a:rPr lang="en" sz="1300" b="1" dirty="0">
                 <a:solidFill>
                   <a:schemeClr val="dk1"/>
                 </a:solidFill>
@@ -25677,7 +25626,7 @@
               <a:t>price</a:t>
             </a:r>
             <a:r>
-              <a:rPr lang="en" sz="1300">
+              <a:rPr lang="en" sz="1300" dirty="0">
                 <a:solidFill>
                   <a:schemeClr val="dk1"/>
                 </a:solidFill>
@@ -25688,7 +25637,7 @@
               </a:rPr>
               <a:t>();</a:t>
             </a:r>
-            <a:endParaRPr/>
+            <a:endParaRPr dirty="0"/>
           </a:p>
         </p:txBody>
       </p:sp>
@@ -25789,17 +25738,9 @@
           </a:bodyPr>
           <a:lstStyle/>
           <a:p>
-            <a:pPr marL="0" lvl="0" indent="0" algn="l" rtl="0">
-              <a:spcBef>
-                <a:spcPts val="0"/>
-              </a:spcBef>
-              <a:spcAft>
-                <a:spcPts val="0"/>
-              </a:spcAft>
-              <a:buNone/>
-            </a:pPr>
-            <a:r>
-              <a:rPr lang="en" sz="1300">
+            <a:pPr lvl="0"/>
+            <a:r>
+              <a:rPr lang="en-GB" sz="1300" dirty="0">
                 <a:solidFill>
                   <a:schemeClr val="dk1"/>
                 </a:solidFill>
@@ -25808,10 +25749,10 @@
                 <a:cs typeface="Proxima Nova"/>
                 <a:sym typeface="Proxima Nova"/>
               </a:rPr>
-              <a:t>byte </a:t>
-            </a:r>
-            <a:r>
-              <a:rPr lang="en" sz="1300" b="1">
+              <a:t>string </a:t>
+            </a:r>
+            <a:r>
+              <a:rPr lang="en-GB" sz="1300" b="1" dirty="0">
                 <a:solidFill>
                   <a:schemeClr val="dk1"/>
                 </a:solidFill>
@@ -25820,10 +25761,10 @@
                 <a:cs typeface="Proxima Nova"/>
                 <a:sym typeface="Proxima Nova"/>
               </a:rPr>
-              <a:t>read</a:t>
-            </a:r>
-            <a:r>
-              <a:rPr lang="en" sz="1300">
+              <a:t>description</a:t>
+            </a:r>
+            <a:r>
+              <a:rPr lang="en-GB" sz="1300" dirty="0">
                 <a:solidFill>
                   <a:schemeClr val="dk1"/>
                 </a:solidFill>
@@ -25834,28 +25775,11 @@
               </a:rPr>
               <a:t>();</a:t>
             </a:r>
-            <a:endParaRPr sz="1300">
-              <a:solidFill>
-                <a:schemeClr val="dk1"/>
-              </a:solidFill>
-              <a:latin typeface="Proxima Nova"/>
-              <a:ea typeface="Proxima Nova"/>
-              <a:cs typeface="Proxima Nova"/>
-              <a:sym typeface="Proxima Nova"/>
-            </a:endParaRPr>
-          </a:p>
-          <a:p>
-            <a:pPr marL="0" lvl="0" indent="0" algn="l" rtl="0">
-              <a:spcBef>
-                <a:spcPts val="0"/>
-              </a:spcBef>
-              <a:spcAft>
-                <a:spcPts val="0"/>
-              </a:spcAft>
-              <a:buNone/>
-            </a:pPr>
-            <a:r>
-              <a:rPr lang="en" sz="1300">
+          </a:p>
+          <a:p>
+            <a:pPr lvl="0"/>
+            <a:r>
+              <a:rPr lang="en-GB" sz="1300" dirty="0">
                 <a:solidFill>
                   <a:schemeClr val="dk1"/>
                 </a:solidFill>
@@ -25864,10 +25788,10 @@
                 <a:cs typeface="Proxima Nova"/>
                 <a:sym typeface="Proxima Nova"/>
               </a:rPr>
-              <a:t>void </a:t>
-            </a:r>
-            <a:r>
-              <a:rPr lang="en" sz="1300" b="1">
+              <a:t>double </a:t>
+            </a:r>
+            <a:r>
+              <a:rPr lang="en-GB" sz="1300" b="1" dirty="0">
                 <a:solidFill>
                   <a:schemeClr val="dk1"/>
                 </a:solidFill>
@@ -25876,10 +25800,10 @@
                 <a:cs typeface="Proxima Nova"/>
                 <a:sym typeface="Proxima Nova"/>
               </a:rPr>
-              <a:t>write</a:t>
-            </a:r>
-            <a:r>
-              <a:rPr lang="en" sz="1300">
+              <a:t>price</a:t>
+            </a:r>
+            <a:r>
+              <a:rPr lang="en-GB" sz="1300" dirty="0">
                 <a:solidFill>
                   <a:schemeClr val="dk1"/>
                 </a:solidFill>
@@ -25888,33 +25812,9 @@
                 <a:cs typeface="Proxima Nova"/>
                 <a:sym typeface="Proxima Nova"/>
               </a:rPr>
-              <a:t>(byte </a:t>
-            </a:r>
-            <a:r>
-              <a:rPr lang="en" sz="1300" b="1">
-                <a:solidFill>
-                  <a:schemeClr val="dk1"/>
-                </a:solidFill>
-                <a:latin typeface="Proxima Nova"/>
-                <a:ea typeface="Proxima Nova"/>
-                <a:cs typeface="Proxima Nova"/>
-                <a:sym typeface="Proxima Nova"/>
-              </a:rPr>
-              <a:t>b</a:t>
-            </a:r>
-            <a:r>
-              <a:rPr lang="en" sz="1300">
-                <a:solidFill>
-                  <a:schemeClr val="dk1"/>
-                </a:solidFill>
-                <a:latin typeface="Proxima Nova"/>
-                <a:ea typeface="Proxima Nova"/>
-                <a:cs typeface="Proxima Nova"/>
-                <a:sym typeface="Proxima Nova"/>
-              </a:rPr>
-              <a:t>);</a:t>
-            </a:r>
-            <a:endParaRPr/>
+              <a:t>();</a:t>
+            </a:r>
+            <a:endParaRPr lang="en-GB" sz="1200" dirty="0"/>
           </a:p>
         </p:txBody>
       </p:sp>
@@ -26042,37 +25942,9 @@
           </a:bodyPr>
           <a:lstStyle/>
           <a:p>
-            <a:pPr marL="0" lvl="0" indent="0" algn="l" rtl="0">
-              <a:spcBef>
-                <a:spcPts val="0"/>
-              </a:spcBef>
-              <a:spcAft>
-                <a:spcPts val="0"/>
-              </a:spcAft>
-              <a:buNone/>
-            </a:pPr>
-            <a:endParaRPr sz="1300">
-              <a:solidFill>
-                <a:schemeClr val="dk1"/>
-              </a:solidFill>
-              <a:latin typeface="Proxima Nova"/>
-              <a:ea typeface="Proxima Nova"/>
-              <a:cs typeface="Proxima Nova"/>
-              <a:sym typeface="Proxima Nova"/>
-            </a:endParaRPr>
-          </a:p>
-          <a:p>
-            <a:pPr marL="0" lvl="0" indent="0" algn="l" rtl="0">
-              <a:spcBef>
-                <a:spcPts val="0"/>
-              </a:spcBef>
-              <a:spcAft>
-                <a:spcPts val="0"/>
-              </a:spcAft>
-              <a:buNone/>
-            </a:pPr>
-            <a:r>
-              <a:rPr lang="en" sz="1300">
+            <a:pPr lvl="0"/>
+            <a:r>
+              <a:rPr lang="en-GB" sz="1300" dirty="0">
                 <a:solidFill>
                   <a:schemeClr val="dk1"/>
                 </a:solidFill>
@@ -26081,10 +25953,10 @@
                 <a:cs typeface="Proxima Nova"/>
                 <a:sym typeface="Proxima Nova"/>
               </a:rPr>
-              <a:t>byte </a:t>
-            </a:r>
-            <a:r>
-              <a:rPr lang="en" sz="1300" b="1">
+              <a:t>string </a:t>
+            </a:r>
+            <a:r>
+              <a:rPr lang="en-GB" sz="1300" b="1" dirty="0">
                 <a:solidFill>
                   <a:schemeClr val="dk1"/>
                 </a:solidFill>
@@ -26093,10 +25965,10 @@
                 <a:cs typeface="Proxima Nova"/>
                 <a:sym typeface="Proxima Nova"/>
               </a:rPr>
-              <a:t>read</a:t>
-            </a:r>
-            <a:r>
-              <a:rPr lang="en" sz="1300">
+              <a:t>description</a:t>
+            </a:r>
+            <a:r>
+              <a:rPr lang="en-GB" sz="1300" dirty="0">
                 <a:solidFill>
                   <a:schemeClr val="dk1"/>
                 </a:solidFill>
@@ -26107,28 +25979,11 @@
               </a:rPr>
               <a:t>();</a:t>
             </a:r>
-            <a:endParaRPr sz="1300">
-              <a:solidFill>
-                <a:schemeClr val="dk1"/>
-              </a:solidFill>
-              <a:latin typeface="Proxima Nova"/>
-              <a:ea typeface="Proxima Nova"/>
-              <a:cs typeface="Proxima Nova"/>
-              <a:sym typeface="Proxima Nova"/>
-            </a:endParaRPr>
-          </a:p>
-          <a:p>
-            <a:pPr marL="0" lvl="0" indent="0" algn="l" rtl="0">
-              <a:spcBef>
-                <a:spcPts val="0"/>
-              </a:spcBef>
-              <a:spcAft>
-                <a:spcPts val="0"/>
-              </a:spcAft>
-              <a:buNone/>
-            </a:pPr>
-            <a:r>
-              <a:rPr lang="en" sz="1300">
+          </a:p>
+          <a:p>
+            <a:pPr lvl="0"/>
+            <a:r>
+              <a:rPr lang="en-GB" sz="1300" dirty="0">
                 <a:solidFill>
                   <a:schemeClr val="dk1"/>
                 </a:solidFill>
@@ -26137,10 +25992,10 @@
                 <a:cs typeface="Proxima Nova"/>
                 <a:sym typeface="Proxima Nova"/>
               </a:rPr>
-              <a:t>void </a:t>
-            </a:r>
-            <a:r>
-              <a:rPr lang="en" sz="1300" b="1">
+              <a:t>double </a:t>
+            </a:r>
+            <a:r>
+              <a:rPr lang="en-GB" sz="1300" b="1" dirty="0">
                 <a:solidFill>
                   <a:schemeClr val="dk1"/>
                 </a:solidFill>
@@ -26149,10 +26004,10 @@
                 <a:cs typeface="Proxima Nova"/>
                 <a:sym typeface="Proxima Nova"/>
               </a:rPr>
-              <a:t>write</a:t>
-            </a:r>
-            <a:r>
-              <a:rPr lang="en" sz="1300">
+              <a:t>price</a:t>
+            </a:r>
+            <a:r>
+              <a:rPr lang="en-GB" sz="1300" dirty="0">
                 <a:solidFill>
                   <a:schemeClr val="dk1"/>
                 </a:solidFill>
@@ -26161,33 +26016,9 @@
                 <a:cs typeface="Proxima Nova"/>
                 <a:sym typeface="Proxima Nova"/>
               </a:rPr>
-              <a:t>(byte </a:t>
-            </a:r>
-            <a:r>
-              <a:rPr lang="en" sz="1300" b="1">
-                <a:solidFill>
-                  <a:schemeClr val="dk1"/>
-                </a:solidFill>
-                <a:latin typeface="Proxima Nova"/>
-                <a:ea typeface="Proxima Nova"/>
-                <a:cs typeface="Proxima Nova"/>
-                <a:sym typeface="Proxima Nova"/>
-              </a:rPr>
-              <a:t>b</a:t>
-            </a:r>
-            <a:r>
-              <a:rPr lang="en" sz="1300">
-                <a:solidFill>
-                  <a:schemeClr val="dk1"/>
-                </a:solidFill>
-                <a:latin typeface="Proxima Nova"/>
-                <a:ea typeface="Proxima Nova"/>
-                <a:cs typeface="Proxima Nova"/>
-                <a:sym typeface="Proxima Nova"/>
-              </a:rPr>
-              <a:t>);</a:t>
-            </a:r>
-            <a:endParaRPr/>
+              <a:t>();</a:t>
+            </a:r>
+            <a:endParaRPr lang="en-GB" sz="1200" dirty="0"/>
           </a:p>
         </p:txBody>
       </p:sp>
@@ -27086,13 +26917,13 @@
   <p:clrMapOvr>
     <a:masterClrMapping/>
   </p:clrMapOvr>
-  <mc:AlternateContent xmlns:mc="http://schemas.openxmlformats.org/markup-compatibility/2006">
-    <mc:Choice xmlns:p14="http://schemas.microsoft.com/office/powerpoint/2010/main" Requires="p14">
+  <mc:AlternateContent xmlns:mc="http://schemas.openxmlformats.org/markup-compatibility/2006" xmlns:p14="http://schemas.microsoft.com/office/powerpoint/2010/main">
+    <mc:Choice Requires="p14">
       <p:transition spd="med" p14:dur="700">
         <p:fade/>
       </p:transition>
     </mc:Choice>
-    <mc:Fallback>
+    <mc:Fallback xmlns="">
       <p:transition spd="med">
         <p:fade/>
       </p:transition>
@@ -28562,13 +28393,13 @@
   <p:clrMapOvr>
     <a:masterClrMapping/>
   </p:clrMapOvr>
-  <mc:AlternateContent xmlns:mc="http://schemas.openxmlformats.org/markup-compatibility/2006">
-    <mc:Choice xmlns:p14="http://schemas.microsoft.com/office/powerpoint/2010/main" Requires="p14">
+  <mc:AlternateContent xmlns:mc="http://schemas.openxmlformats.org/markup-compatibility/2006" xmlns:p14="http://schemas.microsoft.com/office/powerpoint/2010/main">
+    <mc:Choice Requires="p14">
       <p:transition spd="med" p14:dur="700">
         <p:fade/>
       </p:transition>
     </mc:Choice>
-    <mc:Fallback>
+    <mc:Fallback xmlns="">
       <p:transition spd="med">
         <p:fade/>
       </p:transition>
@@ -28646,13 +28477,13 @@
   <p:clrMapOvr>
     <a:masterClrMapping/>
   </p:clrMapOvr>
-  <mc:AlternateContent xmlns:mc="http://schemas.openxmlformats.org/markup-compatibility/2006">
-    <mc:Choice xmlns:p14="http://schemas.microsoft.com/office/powerpoint/2010/main" Requires="p14">
+  <mc:AlternateContent xmlns:mc="http://schemas.openxmlformats.org/markup-compatibility/2006" xmlns:p14="http://schemas.microsoft.com/office/powerpoint/2010/main">
+    <mc:Choice Requires="p14">
       <p:transition spd="med" p14:dur="700">
         <p:fade/>
       </p:transition>
     </mc:Choice>
-    <mc:Fallback>
+    <mc:Fallback xmlns="">
       <p:transition spd="med">
         <p:fade/>
       </p:transition>
@@ -30049,13 +29880,13 @@
   <p:clrMapOvr>
     <a:masterClrMapping/>
   </p:clrMapOvr>
-  <mc:AlternateContent xmlns:mc="http://schemas.openxmlformats.org/markup-compatibility/2006">
-    <mc:Choice xmlns:p14="http://schemas.microsoft.com/office/powerpoint/2010/main" Requires="p14">
+  <mc:AlternateContent xmlns:mc="http://schemas.openxmlformats.org/markup-compatibility/2006" xmlns:p14="http://schemas.microsoft.com/office/powerpoint/2010/main">
+    <mc:Choice Requires="p14">
       <p:transition spd="med" p14:dur="700">
         <p:fade/>
       </p:transition>
     </mc:Choice>
-    <mc:Fallback>
+    <mc:Fallback xmlns="">
       <p:transition spd="med">
         <p:fade/>
       </p:transition>
@@ -30714,13 +30545,13 @@
   <p:clrMapOvr>
     <a:masterClrMapping/>
   </p:clrMapOvr>
-  <mc:AlternateContent xmlns:mc="http://schemas.openxmlformats.org/markup-compatibility/2006">
-    <mc:Choice xmlns:p14="http://schemas.microsoft.com/office/powerpoint/2010/main" Requires="p14">
+  <mc:AlternateContent xmlns:mc="http://schemas.openxmlformats.org/markup-compatibility/2006" xmlns:p14="http://schemas.microsoft.com/office/powerpoint/2010/main">
+    <mc:Choice Requires="p14">
       <p:transition spd="med" p14:dur="700">
         <p:fade/>
       </p:transition>
     </mc:Choice>
-    <mc:Fallback>
+    <mc:Fallback xmlns="">
       <p:transition spd="med">
         <p:fade/>
       </p:transition>
@@ -31564,13 +31395,13 @@
   <p:clrMapOvr>
     <a:masterClrMapping/>
   </p:clrMapOvr>
-  <mc:AlternateContent xmlns:mc="http://schemas.openxmlformats.org/markup-compatibility/2006">
-    <mc:Choice xmlns:p14="http://schemas.microsoft.com/office/powerpoint/2010/main" Requires="p14">
+  <mc:AlternateContent xmlns:mc="http://schemas.openxmlformats.org/markup-compatibility/2006" xmlns:p14="http://schemas.microsoft.com/office/powerpoint/2010/main">
+    <mc:Choice Requires="p14">
       <p:transition spd="med" p14:dur="700">
         <p:fade/>
       </p:transition>
     </mc:Choice>
-    <mc:Fallback>
+    <mc:Fallback xmlns="">
       <p:transition spd="med">
         <p:fade/>
       </p:transition>
@@ -32489,13 +32320,13 @@
   <p:clrMapOvr>
     <a:masterClrMapping/>
   </p:clrMapOvr>
-  <mc:AlternateContent xmlns:mc="http://schemas.openxmlformats.org/markup-compatibility/2006">
-    <mc:Choice xmlns:p14="http://schemas.microsoft.com/office/powerpoint/2010/main" Requires="p14">
+  <mc:AlternateContent xmlns:mc="http://schemas.openxmlformats.org/markup-compatibility/2006" xmlns:p14="http://schemas.microsoft.com/office/powerpoint/2010/main">
+    <mc:Choice Requires="p14">
       <p:transition spd="med" p14:dur="700">
         <p:fade/>
       </p:transition>
     </mc:Choice>
-    <mc:Fallback>
+    <mc:Fallback xmlns="">
       <p:transition spd="med">
         <p:fade/>
       </p:transition>
@@ -33414,13 +33245,13 @@
   <p:clrMapOvr>
     <a:masterClrMapping/>
   </p:clrMapOvr>
-  <mc:AlternateContent xmlns:mc="http://schemas.openxmlformats.org/markup-compatibility/2006">
-    <mc:Choice xmlns:p14="http://schemas.microsoft.com/office/powerpoint/2010/main" Requires="p14">
+  <mc:AlternateContent xmlns:mc="http://schemas.openxmlformats.org/markup-compatibility/2006" xmlns:p14="http://schemas.microsoft.com/office/powerpoint/2010/main">
+    <mc:Choice Requires="p14">
       <p:transition spd="med" p14:dur="700">
         <p:fade/>
       </p:transition>
     </mc:Choice>
-    <mc:Fallback>
+    <mc:Fallback xmlns="">
       <p:transition spd="med">
         <p:fade/>
       </p:transition>
@@ -33493,13 +33324,13 @@
   <p:clrMapOvr>
     <a:masterClrMapping/>
   </p:clrMapOvr>
-  <mc:AlternateContent xmlns:mc="http://schemas.openxmlformats.org/markup-compatibility/2006">
-    <mc:Choice xmlns:p14="http://schemas.microsoft.com/office/powerpoint/2010/main" Requires="p14">
+  <mc:AlternateContent xmlns:mc="http://schemas.openxmlformats.org/markup-compatibility/2006" xmlns:p14="http://schemas.microsoft.com/office/powerpoint/2010/main">
+    <mc:Choice Requires="p14">
       <p:transition spd="med" p14:dur="700">
         <p:fade/>
       </p:transition>
     </mc:Choice>
-    <mc:Fallback>
+    <mc:Fallback xmlns="">
       <p:transition spd="med">
         <p:fade/>
       </p:transition>
@@ -33614,13 +33445,13 @@
   <p:clrMapOvr>
     <a:masterClrMapping/>
   </p:clrMapOvr>
-  <mc:AlternateContent xmlns:mc="http://schemas.openxmlformats.org/markup-compatibility/2006">
-    <mc:Choice xmlns:p14="http://schemas.microsoft.com/office/powerpoint/2010/main" Requires="p14">
+  <mc:AlternateContent xmlns:mc="http://schemas.openxmlformats.org/markup-compatibility/2006" xmlns:p14="http://schemas.microsoft.com/office/powerpoint/2010/main">
+    <mc:Choice Requires="p14">
       <p:transition spd="med" p14:dur="700">
         <p:fade/>
       </p:transition>
     </mc:Choice>
-    <mc:Fallback>
+    <mc:Fallback xmlns="">
       <p:transition spd="med">
         <p:fade/>
       </p:transition>
@@ -34139,13 +33970,13 @@
   <p:clrMapOvr>
     <a:masterClrMapping/>
   </p:clrMapOvr>
-  <mc:AlternateContent xmlns:mc="http://schemas.openxmlformats.org/markup-compatibility/2006">
-    <mc:Choice xmlns:p14="http://schemas.microsoft.com/office/powerpoint/2010/main" Requires="p14">
+  <mc:AlternateContent xmlns:mc="http://schemas.openxmlformats.org/markup-compatibility/2006" xmlns:p14="http://schemas.microsoft.com/office/powerpoint/2010/main">
+    <mc:Choice Requires="p14">
       <p:transition spd="med" p14:dur="700">
         <p:fade/>
       </p:transition>
     </mc:Choice>
-    <mc:Fallback>
+    <mc:Fallback xmlns="">
       <p:transition spd="med">
         <p:fade/>
       </p:transition>
@@ -34700,13 +34531,13 @@
   <p:clrMapOvr>
     <a:masterClrMapping/>
   </p:clrMapOvr>
-  <mc:AlternateContent xmlns:mc="http://schemas.openxmlformats.org/markup-compatibility/2006">
-    <mc:Choice xmlns:p14="http://schemas.microsoft.com/office/powerpoint/2010/main" Requires="p14">
+  <mc:AlternateContent xmlns:mc="http://schemas.openxmlformats.org/markup-compatibility/2006" xmlns:p14="http://schemas.microsoft.com/office/powerpoint/2010/main">
+    <mc:Choice Requires="p14">
       <p:transition spd="med" p14:dur="700">
         <p:fade/>
       </p:transition>
     </mc:Choice>
-    <mc:Fallback>
+    <mc:Fallback xmlns="">
       <p:transition spd="med">
         <p:fade/>
       </p:transition>
@@ -35261,13 +35092,13 @@
   <p:clrMapOvr>
     <a:masterClrMapping/>
   </p:clrMapOvr>
-  <mc:AlternateContent xmlns:mc="http://schemas.openxmlformats.org/markup-compatibility/2006">
-    <mc:Choice xmlns:p14="http://schemas.microsoft.com/office/powerpoint/2010/main" Requires="p14">
+  <mc:AlternateContent xmlns:mc="http://schemas.openxmlformats.org/markup-compatibility/2006" xmlns:p14="http://schemas.microsoft.com/office/powerpoint/2010/main">
+    <mc:Choice Requires="p14">
       <p:transition spd="med" p14:dur="700">
         <p:fade/>
       </p:transition>
     </mc:Choice>
-    <mc:Fallback>
+    <mc:Fallback xmlns="">
       <p:transition spd="med">
         <p:fade/>
       </p:transition>
@@ -35340,13 +35171,13 @@
   <p:clrMapOvr>
     <a:masterClrMapping/>
   </p:clrMapOvr>
-  <mc:AlternateContent xmlns:mc="http://schemas.openxmlformats.org/markup-compatibility/2006">
-    <mc:Choice xmlns:p14="http://schemas.microsoft.com/office/powerpoint/2010/main" Requires="p14">
+  <mc:AlternateContent xmlns:mc="http://schemas.openxmlformats.org/markup-compatibility/2006" xmlns:p14="http://schemas.microsoft.com/office/powerpoint/2010/main">
+    <mc:Choice Requires="p14">
       <p:transition spd="med" p14:dur="700">
         <p:fade/>
       </p:transition>
     </mc:Choice>
-    <mc:Fallback>
+    <mc:Fallback xmlns="">
       <p:transition spd="med">
         <p:fade/>
       </p:transition>
@@ -37267,13 +37098,13 @@
   <p:clrMapOvr>
     <a:masterClrMapping/>
   </p:clrMapOvr>
-  <mc:AlternateContent xmlns:mc="http://schemas.openxmlformats.org/markup-compatibility/2006">
-    <mc:Choice xmlns:p14="http://schemas.microsoft.com/office/powerpoint/2010/main" Requires="p14">
+  <mc:AlternateContent xmlns:mc="http://schemas.openxmlformats.org/markup-compatibility/2006" xmlns:p14="http://schemas.microsoft.com/office/powerpoint/2010/main">
+    <mc:Choice Requires="p14">
       <p:transition spd="med" p14:dur="700">
         <p:fade/>
       </p:transition>
     </mc:Choice>
-    <mc:Fallback>
+    <mc:Fallback xmlns="">
       <p:transition spd="med">
         <p:fade/>
       </p:transition>
@@ -37346,13 +37177,13 @@
   <p:clrMapOvr>
     <a:masterClrMapping/>
   </p:clrMapOvr>
-  <mc:AlternateContent xmlns:mc="http://schemas.openxmlformats.org/markup-compatibility/2006">
-    <mc:Choice xmlns:p14="http://schemas.microsoft.com/office/powerpoint/2010/main" Requires="p14">
+  <mc:AlternateContent xmlns:mc="http://schemas.openxmlformats.org/markup-compatibility/2006" xmlns:p14="http://schemas.microsoft.com/office/powerpoint/2010/main">
+    <mc:Choice Requires="p14">
       <p:transition spd="med" p14:dur="700">
         <p:fade/>
       </p:transition>
     </mc:Choice>
-    <mc:Fallback>
+    <mc:Fallback xmlns="">
       <p:transition spd="med">
         <p:fade/>
       </p:transition>
@@ -37467,13 +37298,13 @@
   <p:clrMapOvr>
     <a:masterClrMapping/>
   </p:clrMapOvr>
-  <mc:AlternateContent xmlns:mc="http://schemas.openxmlformats.org/markup-compatibility/2006">
-    <mc:Choice xmlns:p14="http://schemas.microsoft.com/office/powerpoint/2010/main" Requires="p14">
+  <mc:AlternateContent xmlns:mc="http://schemas.openxmlformats.org/markup-compatibility/2006" xmlns:p14="http://schemas.microsoft.com/office/powerpoint/2010/main">
+    <mc:Choice Requires="p14">
       <p:transition spd="med" p14:dur="700">
         <p:fade/>
       </p:transition>
     </mc:Choice>
-    <mc:Fallback>
+    <mc:Fallback xmlns="">
       <p:transition spd="med">
         <p:fade/>
       </p:transition>
@@ -38474,13 +38305,13 @@
   <p:clrMapOvr>
     <a:masterClrMapping/>
   </p:clrMapOvr>
-  <mc:AlternateContent xmlns:mc="http://schemas.openxmlformats.org/markup-compatibility/2006">
-    <mc:Choice xmlns:p14="http://schemas.microsoft.com/office/powerpoint/2010/main" Requires="p14">
+  <mc:AlternateContent xmlns:mc="http://schemas.openxmlformats.org/markup-compatibility/2006" xmlns:p14="http://schemas.microsoft.com/office/powerpoint/2010/main">
+    <mc:Choice Requires="p14">
       <p:transition spd="med" p14:dur="700">
         <p:fade/>
       </p:transition>
     </mc:Choice>
-    <mc:Fallback>
+    <mc:Fallback xmlns="">
       <p:transition spd="med">
         <p:fade/>
       </p:transition>
@@ -40233,13 +40064,13 @@
   <p:clrMapOvr>
     <a:masterClrMapping/>
   </p:clrMapOvr>
-  <mc:AlternateContent xmlns:mc="http://schemas.openxmlformats.org/markup-compatibility/2006">
-    <mc:Choice xmlns:p14="http://schemas.microsoft.com/office/powerpoint/2010/main" Requires="p14">
+  <mc:AlternateContent xmlns:mc="http://schemas.openxmlformats.org/markup-compatibility/2006" xmlns:p14="http://schemas.microsoft.com/office/powerpoint/2010/main">
+    <mc:Choice Requires="p14">
       <p:transition spd="med" p14:dur="700">
         <p:fade/>
       </p:transition>
     </mc:Choice>
-    <mc:Fallback>
+    <mc:Fallback xmlns="">
       <p:transition spd="med">
         <p:fade/>
       </p:transition>
@@ -40312,13 +40143,13 @@
   <p:clrMapOvr>
     <a:masterClrMapping/>
   </p:clrMapOvr>
-  <mc:AlternateContent xmlns:mc="http://schemas.openxmlformats.org/markup-compatibility/2006">
-    <mc:Choice xmlns:p14="http://schemas.microsoft.com/office/powerpoint/2010/main" Requires="p14">
+  <mc:AlternateContent xmlns:mc="http://schemas.openxmlformats.org/markup-compatibility/2006" xmlns:p14="http://schemas.microsoft.com/office/powerpoint/2010/main">
+    <mc:Choice Requires="p14">
       <p:transition spd="med" p14:dur="700">
         <p:fade/>
       </p:transition>
     </mc:Choice>
-    <mc:Fallback>
+    <mc:Fallback xmlns="">
       <p:transition spd="med">
         <p:fade/>
       </p:transition>

</xml_diff>